<commit_message>
Version 3: VS2017 and strings
</commit_message>
<xml_diff>
--- a/pics.pptx
+++ b/pics.pptx
@@ -107,17 +107,45 @@
       </a:defRPr>
     </a:lvl9pPr>
   </p:defaultTextStyle>
+  <p:extLst>
+    <p:ext uri="{EFAFB233-063F-42B5-8137-9DF3F51BA10A}">
+      <p15:sldGuideLst xmlns:p15="http://schemas.microsoft.com/office/powerpoint/2012/main">
+        <p15:guide id="1" orient="horz" pos="2160">
+          <p15:clr>
+            <a:srgbClr val="A4A3A4"/>
+          </p15:clr>
+        </p15:guide>
+        <p15:guide id="2" pos="2880">
+          <p15:clr>
+            <a:srgbClr val="A4A3A4"/>
+          </p15:clr>
+        </p15:guide>
+      </p15:sldGuideLst>
+    </p:ext>
+  </p:extLst>
 </p:presentation>
 </file>
 
 <file path=ppt/charts/chart1.xml><?xml version="1.0" encoding="utf-8"?>
 <c:chartSpace xmlns:c="http://schemas.openxmlformats.org/drawingml/2006/chart" xmlns:a="http://schemas.openxmlformats.org/drawingml/2006/main" xmlns:r="http://schemas.openxmlformats.org/officeDocument/2006/relationships">
+  <c:date1904 val="0"/>
   <c:lang val="en-US"/>
+  <c:roundedCorners val="0"/>
+  <mc:AlternateContent xmlns:mc="http://schemas.openxmlformats.org/markup-compatibility/2006">
+    <mc:Choice xmlns:c14="http://schemas.microsoft.com/office/drawing/2007/8/2/chart" Requires="c14">
+      <c14:style val="102"/>
+    </mc:Choice>
+    <mc:Fallback>
+      <c:style val="2"/>
+    </mc:Fallback>
+  </mc:AlternateContent>
   <c:chart>
+    <c:autoTitleDeleted val="0"/>
     <c:plotArea>
       <c:layout/>
       <c:scatterChart>
         <c:scatterStyle val="lineMarker"/>
+        <c:varyColors val="0"/>
         <c:ser>
           <c:idx val="0"/>
           <c:order val="0"/>
@@ -185,6 +213,7 @@
               </c:numCache>
             </c:numRef>
           </c:yVal>
+          <c:smooth val="0"/>
         </c:ser>
         <c:ser>
           <c:idx val="1"/>
@@ -273,12 +302,21 @@
               </c:numCache>
             </c:numRef>
           </c:yVal>
+          <c:smooth val="0"/>
         </c:ser>
-        <c:axId val="71519616"/>
-        <c:axId val="71525120"/>
+        <c:dLbls>
+          <c:showLegendKey val="0"/>
+          <c:showVal val="0"/>
+          <c:showCatName val="0"/>
+          <c:showSerName val="0"/>
+          <c:showPercent val="0"/>
+          <c:showBubbleSize val="0"/>
+        </c:dLbls>
+        <c:axId val="384370960"/>
+        <c:axId val="384376840"/>
       </c:scatterChart>
       <c:valAx>
-        <c:axId val="71519616"/>
+        <c:axId val="384370960"/>
         <c:scaling>
           <c:orientation val="minMax"/>
         </c:scaling>
@@ -292,13 +330,15 @@
           </c:spPr>
         </c:majorGridlines>
         <c:numFmt formatCode="General" sourceLinked="1"/>
+        <c:majorTickMark val="out"/>
+        <c:minorTickMark val="none"/>
         <c:tickLblPos val="none"/>
-        <c:crossAx val="71525120"/>
+        <c:crossAx val="384376840"/>
         <c:crosses val="autoZero"/>
         <c:crossBetween val="midCat"/>
       </c:valAx>
       <c:valAx>
-        <c:axId val="71525120"/>
+        <c:axId val="384376840"/>
         <c:scaling>
           <c:orientation val="minMax"/>
           <c:min val="2"/>
@@ -316,19 +356,25 @@
           </c:spPr>
         </c:majorGridlines>
         <c:numFmt formatCode="General" sourceLinked="1"/>
+        <c:majorTickMark val="out"/>
+        <c:minorTickMark val="none"/>
         <c:tickLblPos val="none"/>
-        <c:crossAx val="71519616"/>
+        <c:crossAx val="384370960"/>
         <c:crosses val="autoZero"/>
         <c:crossBetween val="midCat"/>
       </c:valAx>
     </c:plotArea>
     <c:legend>
       <c:legendPos val="r"/>
-      <c:layout/>
+      <c:overlay val="0"/>
     </c:legend>
     <c:plotVisOnly val="1"/>
+    <c:dispBlanksAs val="gap"/>
+    <c:showDLblsOverMax val="0"/>
   </c:chart>
-  <c:externalData r:id="rId1"/>
+  <c:externalData r:id="rId1">
+    <c:autoUpdate val="0"/>
+  </c:externalData>
 </c:chartSpace>
 </file>
 
@@ -513,7 +559,7 @@
           <a:p>
             <a:fld id="{2D771074-853E-4E91-BCA7-9B455C9AACED}" type="datetimeFigureOut">
               <a:rPr lang="en-US" smtClean="0"/>
-              <a:t>8/4/2016</a:t>
+              <a:t>8/27/2018</a:t>
             </a:fld>
             <a:endParaRPr lang="en-US"/>
           </a:p>
@@ -678,7 +724,7 @@
           <a:p>
             <a:fld id="{2D771074-853E-4E91-BCA7-9B455C9AACED}" type="datetimeFigureOut">
               <a:rPr lang="en-US" smtClean="0"/>
-              <a:t>8/4/2016</a:t>
+              <a:t>8/27/2018</a:t>
             </a:fld>
             <a:endParaRPr lang="en-US"/>
           </a:p>
@@ -853,7 +899,7 @@
           <a:p>
             <a:fld id="{2D771074-853E-4E91-BCA7-9B455C9AACED}" type="datetimeFigureOut">
               <a:rPr lang="en-US" smtClean="0"/>
-              <a:t>8/4/2016</a:t>
+              <a:t>8/27/2018</a:t>
             </a:fld>
             <a:endParaRPr lang="en-US"/>
           </a:p>
@@ -1018,7 +1064,7 @@
           <a:p>
             <a:fld id="{2D771074-853E-4E91-BCA7-9B455C9AACED}" type="datetimeFigureOut">
               <a:rPr lang="en-US" smtClean="0"/>
-              <a:t>8/4/2016</a:t>
+              <a:t>8/27/2018</a:t>
             </a:fld>
             <a:endParaRPr lang="en-US"/>
           </a:p>
@@ -1259,7 +1305,7 @@
           <a:p>
             <a:fld id="{2D771074-853E-4E91-BCA7-9B455C9AACED}" type="datetimeFigureOut">
               <a:rPr lang="en-US" smtClean="0"/>
-              <a:t>8/4/2016</a:t>
+              <a:t>8/27/2018</a:t>
             </a:fld>
             <a:endParaRPr lang="en-US"/>
           </a:p>
@@ -1542,7 +1588,7 @@
           <a:p>
             <a:fld id="{2D771074-853E-4E91-BCA7-9B455C9AACED}" type="datetimeFigureOut">
               <a:rPr lang="en-US" smtClean="0"/>
-              <a:t>8/4/2016</a:t>
+              <a:t>8/27/2018</a:t>
             </a:fld>
             <a:endParaRPr lang="en-US"/>
           </a:p>
@@ -1959,7 +2005,7 @@
           <a:p>
             <a:fld id="{2D771074-853E-4E91-BCA7-9B455C9AACED}" type="datetimeFigureOut">
               <a:rPr lang="en-US" smtClean="0"/>
-              <a:t>8/4/2016</a:t>
+              <a:t>8/27/2018</a:t>
             </a:fld>
             <a:endParaRPr lang="en-US"/>
           </a:p>
@@ -2072,7 +2118,7 @@
           <a:p>
             <a:fld id="{2D771074-853E-4E91-BCA7-9B455C9AACED}" type="datetimeFigureOut">
               <a:rPr lang="en-US" smtClean="0"/>
-              <a:t>8/4/2016</a:t>
+              <a:t>8/27/2018</a:t>
             </a:fld>
             <a:endParaRPr lang="en-US"/>
           </a:p>
@@ -2162,7 +2208,7 @@
           <a:p>
             <a:fld id="{2D771074-853E-4E91-BCA7-9B455C9AACED}" type="datetimeFigureOut">
               <a:rPr lang="en-US" smtClean="0"/>
-              <a:t>8/4/2016</a:t>
+              <a:t>8/27/2018</a:t>
             </a:fld>
             <a:endParaRPr lang="en-US"/>
           </a:p>
@@ -2434,7 +2480,7 @@
           <a:p>
             <a:fld id="{2D771074-853E-4E91-BCA7-9B455C9AACED}" type="datetimeFigureOut">
               <a:rPr lang="en-US" smtClean="0"/>
-              <a:t>8/4/2016</a:t>
+              <a:t>8/27/2018</a:t>
             </a:fld>
             <a:endParaRPr lang="en-US"/>
           </a:p>
@@ -2682,7 +2728,7 @@
           <a:p>
             <a:fld id="{2D771074-853E-4E91-BCA7-9B455C9AACED}" type="datetimeFigureOut">
               <a:rPr lang="en-US" smtClean="0"/>
-              <a:t>8/4/2016</a:t>
+              <a:t>8/27/2018</a:t>
             </a:fld>
             <a:endParaRPr lang="en-US"/>
           </a:p>
@@ -2890,7 +2936,7 @@
           <a:p>
             <a:fld id="{2D771074-853E-4E91-BCA7-9B455C9AACED}" type="datetimeFigureOut">
               <a:rPr lang="en-US" smtClean="0"/>
-              <a:t>8/4/2016</a:t>
+              <a:t>8/27/2018</a:t>
             </a:fld>
             <a:endParaRPr lang="en-US"/>
           </a:p>
@@ -4111,6 +4157,852 @@
           </a:p>
         </p:txBody>
       </p:sp>
+      <p:sp>
+        <p:nvSpPr>
+          <p:cNvPr id="2" name="Rectangle 1"/>
+          <p:cNvSpPr/>
+          <p:nvPr/>
+        </p:nvSpPr>
+        <p:spPr>
+          <a:xfrm>
+            <a:off x="1331640" y="966790"/>
+            <a:ext cx="4572000" cy="369332"/>
+          </a:xfrm>
+          <a:prstGeom prst="rect">
+            <a:avLst/>
+          </a:prstGeom>
+        </p:spPr>
+        <p:txBody>
+          <a:bodyPr>
+            <a:spAutoFit/>
+          </a:bodyPr>
+          <a:lstStyle/>
+          <a:p>
+            <a:r>
+              <a:rPr lang="en-GB" sz="900" dirty="0">
+                <a:solidFill>
+                  <a:srgbClr val="0000FF"/>
+                </a:solidFill>
+                <a:latin typeface="Consolas" panose="020B0609020204030204" pitchFamily="49" charset="0"/>
+              </a:rPr>
+              <a:t>extern</a:t>
+            </a:r>
+            <a:r>
+              <a:rPr lang="en-GB" sz="900" dirty="0">
+                <a:solidFill>
+                  <a:srgbClr val="000000"/>
+                </a:solidFill>
+                <a:latin typeface="Consolas" panose="020B0609020204030204" pitchFamily="49" charset="0"/>
+              </a:rPr>
+              <a:t> </a:t>
+            </a:r>
+            <a:r>
+              <a:rPr lang="en-GB" sz="900" dirty="0">
+                <a:solidFill>
+                  <a:srgbClr val="A31515"/>
+                </a:solidFill>
+                <a:latin typeface="Consolas" panose="020B0609020204030204" pitchFamily="49" charset="0"/>
+              </a:rPr>
+              <a:t>"C"</a:t>
+            </a:r>
+            <a:r>
+              <a:rPr lang="en-GB" sz="900" dirty="0">
+                <a:solidFill>
+                  <a:srgbClr val="000000"/>
+                </a:solidFill>
+                <a:latin typeface="Consolas" panose="020B0609020204030204" pitchFamily="49" charset="0"/>
+              </a:rPr>
+              <a:t> </a:t>
+            </a:r>
+            <a:r>
+              <a:rPr lang="en-GB" sz="900" dirty="0">
+                <a:solidFill>
+                  <a:srgbClr val="0000FF"/>
+                </a:solidFill>
+                <a:latin typeface="Consolas" panose="020B0609020204030204" pitchFamily="49" charset="0"/>
+              </a:rPr>
+              <a:t>__</a:t>
+            </a:r>
+            <a:r>
+              <a:rPr lang="en-GB" sz="900" dirty="0" err="1">
+                <a:solidFill>
+                  <a:srgbClr val="0000FF"/>
+                </a:solidFill>
+                <a:latin typeface="Consolas" panose="020B0609020204030204" pitchFamily="49" charset="0"/>
+              </a:rPr>
+              <a:t>declspec</a:t>
+            </a:r>
+            <a:r>
+              <a:rPr lang="en-GB" sz="900" dirty="0">
+                <a:solidFill>
+                  <a:srgbClr val="000000"/>
+                </a:solidFill>
+                <a:latin typeface="Consolas" panose="020B0609020204030204" pitchFamily="49" charset="0"/>
+              </a:rPr>
+              <a:t>(</a:t>
+            </a:r>
+            <a:r>
+              <a:rPr lang="en-GB" sz="900" dirty="0" err="1">
+                <a:solidFill>
+                  <a:srgbClr val="0000FF"/>
+                </a:solidFill>
+                <a:latin typeface="Consolas" panose="020B0609020204030204" pitchFamily="49" charset="0"/>
+              </a:rPr>
+              <a:t>dllexport</a:t>
+            </a:r>
+            <a:r>
+              <a:rPr lang="en-GB" sz="900" dirty="0">
+                <a:solidFill>
+                  <a:srgbClr val="000000"/>
+                </a:solidFill>
+                <a:latin typeface="Consolas" panose="020B0609020204030204" pitchFamily="49" charset="0"/>
+              </a:rPr>
+              <a:t>)</a:t>
+            </a:r>
+          </a:p>
+          <a:p>
+            <a:r>
+              <a:rPr lang="en-GB" sz="900" dirty="0">
+                <a:solidFill>
+                  <a:srgbClr val="0000FF"/>
+                </a:solidFill>
+                <a:latin typeface="Consolas" panose="020B0609020204030204" pitchFamily="49" charset="0"/>
+              </a:rPr>
+              <a:t>double</a:t>
+            </a:r>
+            <a:r>
+              <a:rPr lang="en-GB" sz="900" dirty="0">
+                <a:solidFill>
+                  <a:srgbClr val="000000"/>
+                </a:solidFill>
+                <a:latin typeface="Consolas" panose="020B0609020204030204" pitchFamily="49" charset="0"/>
+              </a:rPr>
+              <a:t> </a:t>
+            </a:r>
+            <a:r>
+              <a:rPr lang="en-GB" sz="900" dirty="0" err="1">
+                <a:solidFill>
+                  <a:srgbClr val="000000"/>
+                </a:solidFill>
+                <a:latin typeface="Consolas" panose="020B0609020204030204" pitchFamily="49" charset="0"/>
+              </a:rPr>
+              <a:t>xSumForName</a:t>
+            </a:r>
+            <a:r>
+              <a:rPr lang="en-GB" sz="900" dirty="0">
+                <a:solidFill>
+                  <a:srgbClr val="000000"/>
+                </a:solidFill>
+                <a:latin typeface="Consolas" panose="020B0609020204030204" pitchFamily="49" charset="0"/>
+              </a:rPr>
+              <a:t>(</a:t>
+            </a:r>
+            <a:r>
+              <a:rPr lang="en-GB" sz="900" dirty="0">
+                <a:solidFill>
+                  <a:srgbClr val="2B91AF"/>
+                </a:solidFill>
+                <a:latin typeface="Consolas" panose="020B0609020204030204" pitchFamily="49" charset="0"/>
+              </a:rPr>
+              <a:t>LPXLOPER12</a:t>
+            </a:r>
+            <a:r>
+              <a:rPr lang="en-GB" sz="900" dirty="0">
+                <a:solidFill>
+                  <a:srgbClr val="000000"/>
+                </a:solidFill>
+                <a:latin typeface="Consolas" panose="020B0609020204030204" pitchFamily="49" charset="0"/>
+              </a:rPr>
+              <a:t> </a:t>
+            </a:r>
+            <a:r>
+              <a:rPr lang="en-GB" sz="900" dirty="0">
+                <a:solidFill>
+                  <a:srgbClr val="808080"/>
+                </a:solidFill>
+                <a:latin typeface="Consolas" panose="020B0609020204030204" pitchFamily="49" charset="0"/>
+              </a:rPr>
+              <a:t>tab</a:t>
+            </a:r>
+            <a:r>
+              <a:rPr lang="en-GB" sz="900" dirty="0">
+                <a:solidFill>
+                  <a:srgbClr val="000000"/>
+                </a:solidFill>
+                <a:latin typeface="Consolas" panose="020B0609020204030204" pitchFamily="49" charset="0"/>
+              </a:rPr>
+              <a:t>, </a:t>
+            </a:r>
+            <a:r>
+              <a:rPr lang="en-GB" sz="900" dirty="0">
+                <a:solidFill>
+                  <a:srgbClr val="2B91AF"/>
+                </a:solidFill>
+                <a:latin typeface="Consolas" panose="020B0609020204030204" pitchFamily="49" charset="0"/>
+              </a:rPr>
+              <a:t>LPXLOPER12</a:t>
+            </a:r>
+            <a:r>
+              <a:rPr lang="en-GB" sz="900" dirty="0">
+                <a:solidFill>
+                  <a:srgbClr val="000000"/>
+                </a:solidFill>
+                <a:latin typeface="Consolas" panose="020B0609020204030204" pitchFamily="49" charset="0"/>
+              </a:rPr>
+              <a:t> </a:t>
+            </a:r>
+            <a:r>
+              <a:rPr lang="en-GB" sz="900" dirty="0" err="1">
+                <a:solidFill>
+                  <a:srgbClr val="808080"/>
+                </a:solidFill>
+                <a:latin typeface="Consolas" panose="020B0609020204030204" pitchFamily="49" charset="0"/>
+              </a:rPr>
+              <a:t>xName</a:t>
+            </a:r>
+            <a:r>
+              <a:rPr lang="en-GB" sz="900" dirty="0">
+                <a:solidFill>
+                  <a:srgbClr val="000000"/>
+                </a:solidFill>
+                <a:latin typeface="Consolas" panose="020B0609020204030204" pitchFamily="49" charset="0"/>
+              </a:rPr>
+              <a:t>)</a:t>
+            </a:r>
+          </a:p>
+        </p:txBody>
+      </p:sp>
+      <p:cxnSp>
+        <p:nvCxnSpPr>
+          <p:cNvPr id="21" name="Straight Arrow Connector 20"/>
+          <p:cNvCxnSpPr/>
+          <p:nvPr/>
+        </p:nvCxnSpPr>
+        <p:spPr>
+          <a:xfrm flipV="1">
+            <a:off x="1619672" y="1340768"/>
+            <a:ext cx="0" cy="360040"/>
+          </a:xfrm>
+          <a:prstGeom prst="straightConnector1">
+            <a:avLst/>
+          </a:prstGeom>
+          <a:ln>
+            <a:tailEnd type="arrow"/>
+          </a:ln>
+        </p:spPr>
+        <p:style>
+          <a:lnRef idx="1">
+            <a:schemeClr val="accent1"/>
+          </a:lnRef>
+          <a:fillRef idx="0">
+            <a:schemeClr val="accent1"/>
+          </a:fillRef>
+          <a:effectRef idx="0">
+            <a:schemeClr val="accent1"/>
+          </a:effectRef>
+          <a:fontRef idx="minor">
+            <a:schemeClr val="tx1"/>
+          </a:fontRef>
+        </p:style>
+      </p:cxnSp>
+      <p:sp>
+        <p:nvSpPr>
+          <p:cNvPr id="22" name="TextBox 21"/>
+          <p:cNvSpPr txBox="1"/>
+          <p:nvPr/>
+        </p:nvSpPr>
+        <p:spPr>
+          <a:xfrm>
+            <a:off x="827584" y="1763524"/>
+            <a:ext cx="1584176" cy="369332"/>
+          </a:xfrm>
+          <a:prstGeom prst="rect">
+            <a:avLst/>
+          </a:prstGeom>
+          <a:noFill/>
+        </p:spPr>
+        <p:txBody>
+          <a:bodyPr wrap="square" rtlCol="0">
+            <a:spAutoFit/>
+          </a:bodyPr>
+          <a:lstStyle/>
+          <a:p>
+            <a:pPr algn="ctr"/>
+            <a:r>
+              <a:rPr lang="en-US" dirty="0" smtClean="0"/>
+              <a:t>B</a:t>
+            </a:r>
+            <a:endParaRPr lang="en-US" dirty="0"/>
+          </a:p>
+        </p:txBody>
+      </p:sp>
+      <p:cxnSp>
+        <p:nvCxnSpPr>
+          <p:cNvPr id="23" name="Straight Arrow Connector 22"/>
+          <p:cNvCxnSpPr/>
+          <p:nvPr/>
+        </p:nvCxnSpPr>
+        <p:spPr>
+          <a:xfrm flipV="1">
+            <a:off x="3932312" y="1340768"/>
+            <a:ext cx="0" cy="360040"/>
+          </a:xfrm>
+          <a:prstGeom prst="straightConnector1">
+            <a:avLst/>
+          </a:prstGeom>
+          <a:ln>
+            <a:tailEnd type="arrow"/>
+          </a:ln>
+        </p:spPr>
+        <p:style>
+          <a:lnRef idx="1">
+            <a:schemeClr val="accent1"/>
+          </a:lnRef>
+          <a:fillRef idx="0">
+            <a:schemeClr val="accent1"/>
+          </a:fillRef>
+          <a:effectRef idx="0">
+            <a:schemeClr val="accent1"/>
+          </a:effectRef>
+          <a:fontRef idx="minor">
+            <a:schemeClr val="tx1"/>
+          </a:fontRef>
+        </p:style>
+      </p:cxnSp>
+      <p:sp>
+        <p:nvSpPr>
+          <p:cNvPr id="24" name="TextBox 23"/>
+          <p:cNvSpPr txBox="1"/>
+          <p:nvPr/>
+        </p:nvSpPr>
+        <p:spPr>
+          <a:xfrm>
+            <a:off x="3140224" y="1763524"/>
+            <a:ext cx="1584176" cy="369332"/>
+          </a:xfrm>
+          <a:prstGeom prst="rect">
+            <a:avLst/>
+          </a:prstGeom>
+          <a:noFill/>
+        </p:spPr>
+        <p:txBody>
+          <a:bodyPr wrap="square" rtlCol="0">
+            <a:spAutoFit/>
+          </a:bodyPr>
+          <a:lstStyle/>
+          <a:p>
+            <a:pPr algn="ctr"/>
+            <a:r>
+              <a:rPr lang="en-US" dirty="0">
+                <a:solidFill>
+                  <a:srgbClr val="FF0000"/>
+                </a:solidFill>
+              </a:rPr>
+              <a:t>Q</a:t>
+            </a:r>
+            <a:endParaRPr lang="en-US" dirty="0">
+              <a:solidFill>
+                <a:srgbClr val="FF0000"/>
+              </a:solidFill>
+            </a:endParaRPr>
+          </a:p>
+        </p:txBody>
+      </p:sp>
+      <p:cxnSp>
+        <p:nvCxnSpPr>
+          <p:cNvPr id="25" name="Straight Arrow Connector 24"/>
+          <p:cNvCxnSpPr/>
+          <p:nvPr/>
+        </p:nvCxnSpPr>
+        <p:spPr>
+          <a:xfrm flipV="1">
+            <a:off x="2996208" y="1340768"/>
+            <a:ext cx="0" cy="360040"/>
+          </a:xfrm>
+          <a:prstGeom prst="straightConnector1">
+            <a:avLst/>
+          </a:prstGeom>
+          <a:ln>
+            <a:tailEnd type="arrow"/>
+          </a:ln>
+        </p:spPr>
+        <p:style>
+          <a:lnRef idx="1">
+            <a:schemeClr val="accent1"/>
+          </a:lnRef>
+          <a:fillRef idx="0">
+            <a:schemeClr val="accent1"/>
+          </a:fillRef>
+          <a:effectRef idx="0">
+            <a:schemeClr val="accent1"/>
+          </a:effectRef>
+          <a:fontRef idx="minor">
+            <a:schemeClr val="tx1"/>
+          </a:fontRef>
+        </p:style>
+      </p:cxnSp>
+      <p:sp>
+        <p:nvSpPr>
+          <p:cNvPr id="26" name="TextBox 25"/>
+          <p:cNvSpPr txBox="1"/>
+          <p:nvPr/>
+        </p:nvSpPr>
+        <p:spPr>
+          <a:xfrm>
+            <a:off x="2204120" y="1763524"/>
+            <a:ext cx="1584176" cy="369332"/>
+          </a:xfrm>
+          <a:prstGeom prst="rect">
+            <a:avLst/>
+          </a:prstGeom>
+          <a:noFill/>
+        </p:spPr>
+        <p:txBody>
+          <a:bodyPr wrap="square" rtlCol="0">
+            <a:spAutoFit/>
+          </a:bodyPr>
+          <a:lstStyle/>
+          <a:p>
+            <a:pPr algn="ctr"/>
+            <a:r>
+              <a:rPr lang="en-US" dirty="0" smtClean="0">
+                <a:solidFill>
+                  <a:srgbClr val="FF0000"/>
+                </a:solidFill>
+              </a:rPr>
+              <a:t>Q</a:t>
+            </a:r>
+            <a:endParaRPr lang="en-US" dirty="0"/>
+          </a:p>
+        </p:txBody>
+      </p:sp>
+      <p:sp>
+        <p:nvSpPr>
+          <p:cNvPr id="27" name="Rectangle 26"/>
+          <p:cNvSpPr/>
+          <p:nvPr/>
+        </p:nvSpPr>
+        <p:spPr>
+          <a:xfrm>
+            <a:off x="5180969" y="366215"/>
+            <a:ext cx="4572000" cy="369332"/>
+          </a:xfrm>
+          <a:prstGeom prst="rect">
+            <a:avLst/>
+          </a:prstGeom>
+        </p:spPr>
+        <p:txBody>
+          <a:bodyPr>
+            <a:spAutoFit/>
+          </a:bodyPr>
+          <a:lstStyle/>
+          <a:p>
+            <a:r>
+              <a:rPr lang="en-GB" sz="900" dirty="0">
+                <a:solidFill>
+                  <a:srgbClr val="0000FF"/>
+                </a:solidFill>
+                <a:latin typeface="Consolas" panose="020B0609020204030204" pitchFamily="49" charset="0"/>
+              </a:rPr>
+              <a:t>extern</a:t>
+            </a:r>
+            <a:r>
+              <a:rPr lang="en-GB" sz="900" dirty="0">
+                <a:solidFill>
+                  <a:srgbClr val="000000"/>
+                </a:solidFill>
+                <a:latin typeface="Consolas" panose="020B0609020204030204" pitchFamily="49" charset="0"/>
+              </a:rPr>
+              <a:t> </a:t>
+            </a:r>
+            <a:r>
+              <a:rPr lang="en-GB" sz="900" dirty="0">
+                <a:solidFill>
+                  <a:srgbClr val="A31515"/>
+                </a:solidFill>
+                <a:latin typeface="Consolas" panose="020B0609020204030204" pitchFamily="49" charset="0"/>
+              </a:rPr>
+              <a:t>"C"</a:t>
+            </a:r>
+            <a:r>
+              <a:rPr lang="en-GB" sz="900" dirty="0">
+                <a:solidFill>
+                  <a:srgbClr val="000000"/>
+                </a:solidFill>
+                <a:latin typeface="Consolas" panose="020B0609020204030204" pitchFamily="49" charset="0"/>
+              </a:rPr>
+              <a:t> </a:t>
+            </a:r>
+            <a:r>
+              <a:rPr lang="en-GB" sz="900" dirty="0">
+                <a:solidFill>
+                  <a:srgbClr val="0000FF"/>
+                </a:solidFill>
+                <a:latin typeface="Consolas" panose="020B0609020204030204" pitchFamily="49" charset="0"/>
+              </a:rPr>
+              <a:t>__</a:t>
+            </a:r>
+            <a:r>
+              <a:rPr lang="en-GB" sz="900" dirty="0" err="1">
+                <a:solidFill>
+                  <a:srgbClr val="0000FF"/>
+                </a:solidFill>
+                <a:latin typeface="Consolas" panose="020B0609020204030204" pitchFamily="49" charset="0"/>
+              </a:rPr>
+              <a:t>declspec</a:t>
+            </a:r>
+            <a:r>
+              <a:rPr lang="en-GB" sz="900" dirty="0">
+                <a:solidFill>
+                  <a:srgbClr val="000000"/>
+                </a:solidFill>
+                <a:latin typeface="Consolas" panose="020B0609020204030204" pitchFamily="49" charset="0"/>
+              </a:rPr>
+              <a:t>(</a:t>
+            </a:r>
+            <a:r>
+              <a:rPr lang="en-GB" sz="900" dirty="0" err="1">
+                <a:solidFill>
+                  <a:srgbClr val="0000FF"/>
+                </a:solidFill>
+                <a:latin typeface="Consolas" panose="020B0609020204030204" pitchFamily="49" charset="0"/>
+              </a:rPr>
+              <a:t>dllexport</a:t>
+            </a:r>
+            <a:r>
+              <a:rPr lang="en-GB" sz="900" dirty="0">
+                <a:solidFill>
+                  <a:srgbClr val="000000"/>
+                </a:solidFill>
+                <a:latin typeface="Consolas" panose="020B0609020204030204" pitchFamily="49" charset="0"/>
+              </a:rPr>
+              <a:t>)</a:t>
+            </a:r>
+          </a:p>
+          <a:p>
+            <a:r>
+              <a:rPr lang="en-GB" sz="900" dirty="0">
+                <a:solidFill>
+                  <a:srgbClr val="2B91AF"/>
+                </a:solidFill>
+                <a:latin typeface="Consolas" panose="020B0609020204030204" pitchFamily="49" charset="0"/>
+              </a:rPr>
+              <a:t>LPXLOPER12</a:t>
+            </a:r>
+            <a:r>
+              <a:rPr lang="en-GB" sz="900" dirty="0">
+                <a:solidFill>
+                  <a:srgbClr val="000000"/>
+                </a:solidFill>
+                <a:latin typeface="Consolas" panose="020B0609020204030204" pitchFamily="49" charset="0"/>
+              </a:rPr>
+              <a:t> </a:t>
+            </a:r>
+            <a:r>
+              <a:rPr lang="en-GB" sz="900" dirty="0" err="1" smtClean="0">
+                <a:solidFill>
+                  <a:srgbClr val="000000"/>
+                </a:solidFill>
+                <a:latin typeface="Consolas" panose="020B0609020204030204" pitchFamily="49" charset="0"/>
+              </a:rPr>
+              <a:t>xSumForName</a:t>
+            </a:r>
+            <a:r>
+              <a:rPr lang="en-GB" sz="900" dirty="0" smtClean="0">
+                <a:solidFill>
+                  <a:srgbClr val="000000"/>
+                </a:solidFill>
+                <a:latin typeface="Consolas" panose="020B0609020204030204" pitchFamily="49" charset="0"/>
+              </a:rPr>
+              <a:t>(</a:t>
+            </a:r>
+            <a:r>
+              <a:rPr lang="en-GB" sz="900" dirty="0" smtClean="0">
+                <a:solidFill>
+                  <a:srgbClr val="2B91AF"/>
+                </a:solidFill>
+                <a:latin typeface="Consolas" panose="020B0609020204030204" pitchFamily="49" charset="0"/>
+              </a:rPr>
+              <a:t>LPXLOPER12</a:t>
+            </a:r>
+            <a:r>
+              <a:rPr lang="en-GB" sz="900" dirty="0" smtClean="0">
+                <a:solidFill>
+                  <a:srgbClr val="000000"/>
+                </a:solidFill>
+                <a:latin typeface="Consolas" panose="020B0609020204030204" pitchFamily="49" charset="0"/>
+              </a:rPr>
+              <a:t> </a:t>
+            </a:r>
+            <a:r>
+              <a:rPr lang="en-GB" sz="900" dirty="0">
+                <a:solidFill>
+                  <a:srgbClr val="808080"/>
+                </a:solidFill>
+                <a:latin typeface="Consolas" panose="020B0609020204030204" pitchFamily="49" charset="0"/>
+              </a:rPr>
+              <a:t>tab</a:t>
+            </a:r>
+            <a:r>
+              <a:rPr lang="en-GB" sz="900" dirty="0">
+                <a:solidFill>
+                  <a:srgbClr val="000000"/>
+                </a:solidFill>
+                <a:latin typeface="Consolas" panose="020B0609020204030204" pitchFamily="49" charset="0"/>
+              </a:rPr>
+              <a:t>, </a:t>
+            </a:r>
+            <a:r>
+              <a:rPr lang="en-GB" sz="900" dirty="0">
+                <a:solidFill>
+                  <a:srgbClr val="2B91AF"/>
+                </a:solidFill>
+                <a:latin typeface="Consolas" panose="020B0609020204030204" pitchFamily="49" charset="0"/>
+              </a:rPr>
+              <a:t>LPXLOPER12</a:t>
+            </a:r>
+            <a:r>
+              <a:rPr lang="en-GB" sz="900" dirty="0">
+                <a:solidFill>
+                  <a:srgbClr val="000000"/>
+                </a:solidFill>
+                <a:latin typeface="Consolas" panose="020B0609020204030204" pitchFamily="49" charset="0"/>
+              </a:rPr>
+              <a:t> </a:t>
+            </a:r>
+            <a:r>
+              <a:rPr lang="en-GB" sz="900" dirty="0" err="1">
+                <a:solidFill>
+                  <a:srgbClr val="808080"/>
+                </a:solidFill>
+                <a:latin typeface="Consolas" panose="020B0609020204030204" pitchFamily="49" charset="0"/>
+              </a:rPr>
+              <a:t>xName</a:t>
+            </a:r>
+            <a:r>
+              <a:rPr lang="en-GB" sz="900" dirty="0">
+                <a:solidFill>
+                  <a:srgbClr val="000000"/>
+                </a:solidFill>
+                <a:latin typeface="Consolas" panose="020B0609020204030204" pitchFamily="49" charset="0"/>
+              </a:rPr>
+              <a:t>)</a:t>
+            </a:r>
+          </a:p>
+        </p:txBody>
+      </p:sp>
+      <p:cxnSp>
+        <p:nvCxnSpPr>
+          <p:cNvPr id="28" name="Straight Arrow Connector 27"/>
+          <p:cNvCxnSpPr/>
+          <p:nvPr/>
+        </p:nvCxnSpPr>
+        <p:spPr>
+          <a:xfrm flipV="1">
+            <a:off x="5469001" y="740193"/>
+            <a:ext cx="0" cy="360040"/>
+          </a:xfrm>
+          <a:prstGeom prst="straightConnector1">
+            <a:avLst/>
+          </a:prstGeom>
+          <a:ln>
+            <a:tailEnd type="arrow"/>
+          </a:ln>
+        </p:spPr>
+        <p:style>
+          <a:lnRef idx="1">
+            <a:schemeClr val="accent1"/>
+          </a:lnRef>
+          <a:fillRef idx="0">
+            <a:schemeClr val="accent1"/>
+          </a:fillRef>
+          <a:effectRef idx="0">
+            <a:schemeClr val="accent1"/>
+          </a:effectRef>
+          <a:fontRef idx="minor">
+            <a:schemeClr val="tx1"/>
+          </a:fontRef>
+        </p:style>
+      </p:cxnSp>
+      <p:sp>
+        <p:nvSpPr>
+          <p:cNvPr id="29" name="TextBox 28"/>
+          <p:cNvSpPr txBox="1"/>
+          <p:nvPr/>
+        </p:nvSpPr>
+        <p:spPr>
+          <a:xfrm>
+            <a:off x="4676913" y="1162949"/>
+            <a:ext cx="1584176" cy="369332"/>
+          </a:xfrm>
+          <a:prstGeom prst="rect">
+            <a:avLst/>
+          </a:prstGeom>
+          <a:noFill/>
+        </p:spPr>
+        <p:txBody>
+          <a:bodyPr wrap="square" rtlCol="0">
+            <a:spAutoFit/>
+          </a:bodyPr>
+          <a:lstStyle/>
+          <a:p>
+            <a:pPr algn="ctr"/>
+            <a:r>
+              <a:rPr lang="en-US" dirty="0" smtClean="0">
+                <a:solidFill>
+                  <a:srgbClr val="FF0000"/>
+                </a:solidFill>
+              </a:rPr>
+              <a:t>Q</a:t>
+            </a:r>
+            <a:endParaRPr lang="en-US" dirty="0">
+              <a:solidFill>
+                <a:srgbClr val="FF0000"/>
+              </a:solidFill>
+            </a:endParaRPr>
+          </a:p>
+        </p:txBody>
+      </p:sp>
+      <p:cxnSp>
+        <p:nvCxnSpPr>
+          <p:cNvPr id="30" name="Straight Arrow Connector 29"/>
+          <p:cNvCxnSpPr/>
+          <p:nvPr/>
+        </p:nvCxnSpPr>
+        <p:spPr>
+          <a:xfrm flipV="1">
+            <a:off x="8028384" y="740193"/>
+            <a:ext cx="0" cy="360040"/>
+          </a:xfrm>
+          <a:prstGeom prst="straightConnector1">
+            <a:avLst/>
+          </a:prstGeom>
+          <a:ln>
+            <a:tailEnd type="arrow"/>
+          </a:ln>
+        </p:spPr>
+        <p:style>
+          <a:lnRef idx="1">
+            <a:schemeClr val="accent1"/>
+          </a:lnRef>
+          <a:fillRef idx="0">
+            <a:schemeClr val="accent1"/>
+          </a:fillRef>
+          <a:effectRef idx="0">
+            <a:schemeClr val="accent1"/>
+          </a:effectRef>
+          <a:fontRef idx="minor">
+            <a:schemeClr val="tx1"/>
+          </a:fontRef>
+        </p:style>
+      </p:cxnSp>
+      <p:sp>
+        <p:nvSpPr>
+          <p:cNvPr id="31" name="TextBox 30"/>
+          <p:cNvSpPr txBox="1"/>
+          <p:nvPr/>
+        </p:nvSpPr>
+        <p:spPr>
+          <a:xfrm>
+            <a:off x="7236296" y="1162949"/>
+            <a:ext cx="1584176" cy="369332"/>
+          </a:xfrm>
+          <a:prstGeom prst="rect">
+            <a:avLst/>
+          </a:prstGeom>
+          <a:noFill/>
+        </p:spPr>
+        <p:txBody>
+          <a:bodyPr wrap="square" rtlCol="0">
+            <a:spAutoFit/>
+          </a:bodyPr>
+          <a:lstStyle/>
+          <a:p>
+            <a:pPr algn="ctr"/>
+            <a:r>
+              <a:rPr lang="en-US" dirty="0">
+                <a:solidFill>
+                  <a:srgbClr val="FF0000"/>
+                </a:solidFill>
+              </a:rPr>
+              <a:t>Q</a:t>
+            </a:r>
+            <a:endParaRPr lang="en-US" dirty="0">
+              <a:solidFill>
+                <a:srgbClr val="FF0000"/>
+              </a:solidFill>
+            </a:endParaRPr>
+          </a:p>
+        </p:txBody>
+      </p:sp>
+      <p:cxnSp>
+        <p:nvCxnSpPr>
+          <p:cNvPr id="32" name="Straight Arrow Connector 31"/>
+          <p:cNvCxnSpPr/>
+          <p:nvPr/>
+        </p:nvCxnSpPr>
+        <p:spPr>
+          <a:xfrm flipV="1">
+            <a:off x="7092280" y="740193"/>
+            <a:ext cx="0" cy="360040"/>
+          </a:xfrm>
+          <a:prstGeom prst="straightConnector1">
+            <a:avLst/>
+          </a:prstGeom>
+          <a:ln>
+            <a:tailEnd type="arrow"/>
+          </a:ln>
+        </p:spPr>
+        <p:style>
+          <a:lnRef idx="1">
+            <a:schemeClr val="accent1"/>
+          </a:lnRef>
+          <a:fillRef idx="0">
+            <a:schemeClr val="accent1"/>
+          </a:fillRef>
+          <a:effectRef idx="0">
+            <a:schemeClr val="accent1"/>
+          </a:effectRef>
+          <a:fontRef idx="minor">
+            <a:schemeClr val="tx1"/>
+          </a:fontRef>
+        </p:style>
+      </p:cxnSp>
+      <p:sp>
+        <p:nvSpPr>
+          <p:cNvPr id="33" name="TextBox 32"/>
+          <p:cNvSpPr txBox="1"/>
+          <p:nvPr/>
+        </p:nvSpPr>
+        <p:spPr>
+          <a:xfrm>
+            <a:off x="6300192" y="1162949"/>
+            <a:ext cx="1584176" cy="369332"/>
+          </a:xfrm>
+          <a:prstGeom prst="rect">
+            <a:avLst/>
+          </a:prstGeom>
+          <a:noFill/>
+        </p:spPr>
+        <p:txBody>
+          <a:bodyPr wrap="square" rtlCol="0">
+            <a:spAutoFit/>
+          </a:bodyPr>
+          <a:lstStyle/>
+          <a:p>
+            <a:pPr algn="ctr"/>
+            <a:r>
+              <a:rPr lang="en-US" dirty="0" smtClean="0">
+                <a:solidFill>
+                  <a:srgbClr val="FF0000"/>
+                </a:solidFill>
+              </a:rPr>
+              <a:t>Q</a:t>
+            </a:r>
+            <a:endParaRPr lang="en-US" dirty="0"/>
+          </a:p>
+        </p:txBody>
+      </p:sp>
     </p:spTree>
   </p:cSld>
   <p:clrMapOvr>
@@ -4560,9 +5452,59 @@
         </p:xfrm>
         <a:graphic>
           <a:graphicData uri="http://schemas.openxmlformats.org/presentationml/2006/ole">
-            <p:oleObj spid="_x0000_s2051" name="Equation" r:id="rId5" imgW="469800" imgH="253800" progId="Equation.DSMT4">
-              <p:embed/>
-            </p:oleObj>
+            <mc:AlternateContent xmlns:mc="http://schemas.openxmlformats.org/markup-compatibility/2006">
+              <mc:Choice xmlns:v="urn:schemas-microsoft-com:vml" Requires="v">
+                <p:oleObj spid="_x0000_s2066" name="Equation" r:id="rId5" imgW="469800" imgH="253800" progId="Equation.DSMT4">
+                  <p:embed/>
+                </p:oleObj>
+              </mc:Choice>
+              <mc:Fallback>
+                <p:oleObj name="Equation" r:id="rId5" imgW="469800" imgH="253800" progId="Equation.DSMT4">
+                  <p:embed/>
+                  <p:pic>
+                    <p:nvPicPr>
+                      <p:cNvPr id="0" name="Picture 3"/>
+                      <p:cNvPicPr>
+                        <a:picLocks noChangeAspect="1" noChangeArrowheads="1"/>
+                      </p:cNvPicPr>
+                      <p:nvPr/>
+                    </p:nvPicPr>
+                    <p:blipFill>
+                      <a:blip r:embed="rId6">
+                        <a:extLst>
+                          <a:ext uri="{28A0092B-C50C-407E-A947-70E740481C1C}">
+                            <a14:useLocalDpi xmlns:a14="http://schemas.microsoft.com/office/drawing/2010/main" val="0"/>
+                          </a:ext>
+                        </a:extLst>
+                      </a:blip>
+                      <a:srcRect/>
+                      <a:stretch>
+                        <a:fillRect/>
+                      </a:stretch>
+                    </p:blipFill>
+                    <p:spPr bwMode="auto">
+                      <a:xfrm>
+                        <a:off x="3165996" y="2526928"/>
+                        <a:ext cx="469900" cy="254000"/>
+                      </a:xfrm>
+                      <a:prstGeom prst="rect">
+                        <a:avLst/>
+                      </a:prstGeom>
+                      <a:noFill/>
+                      <a:extLst>
+                        <a:ext uri="{909E8E84-426E-40DD-AFC4-6F175D3DCCD1}">
+                          <a14:hiddenFill xmlns:a14="http://schemas.microsoft.com/office/drawing/2010/main">
+                            <a:solidFill>
+                              <a:srgbClr val="FFFFFF"/>
+                            </a:solidFill>
+                          </a14:hiddenFill>
+                        </a:ext>
+                      </a:extLst>
+                    </p:spPr>
+                  </p:pic>
+                </p:oleObj>
+              </mc:Fallback>
+            </mc:AlternateContent>
           </a:graphicData>
         </a:graphic>
       </p:graphicFrame>
@@ -4646,9 +5588,59 @@
         </p:xfrm>
         <a:graphic>
           <a:graphicData uri="http://schemas.openxmlformats.org/presentationml/2006/ole">
-            <p:oleObj spid="_x0000_s2052" name="Equation" r:id="rId6" imgW="495000" imgH="253800" progId="Equation.DSMT4">
-              <p:embed/>
-            </p:oleObj>
+            <mc:AlternateContent xmlns:mc="http://schemas.openxmlformats.org/markup-compatibility/2006">
+              <mc:Choice xmlns:v="urn:schemas-microsoft-com:vml" Requires="v">
+                <p:oleObj spid="_x0000_s2067" name="Equation" r:id="rId7" imgW="495000" imgH="253800" progId="Equation.DSMT4">
+                  <p:embed/>
+                </p:oleObj>
+              </mc:Choice>
+              <mc:Fallback>
+                <p:oleObj name="Equation" r:id="rId7" imgW="495000" imgH="253800" progId="Equation.DSMT4">
+                  <p:embed/>
+                  <p:pic>
+                    <p:nvPicPr>
+                      <p:cNvPr id="0" name="Picture 4"/>
+                      <p:cNvPicPr>
+                        <a:picLocks noChangeAspect="1" noChangeArrowheads="1"/>
+                      </p:cNvPicPr>
+                      <p:nvPr/>
+                    </p:nvPicPr>
+                    <p:blipFill>
+                      <a:blip r:embed="rId8">
+                        <a:extLst>
+                          <a:ext uri="{28A0092B-C50C-407E-A947-70E740481C1C}">
+                            <a14:useLocalDpi xmlns:a14="http://schemas.microsoft.com/office/drawing/2010/main" val="0"/>
+                          </a:ext>
+                        </a:extLst>
+                      </a:blip>
+                      <a:srcRect/>
+                      <a:stretch>
+                        <a:fillRect/>
+                      </a:stretch>
+                    </p:blipFill>
+                    <p:spPr bwMode="auto">
+                      <a:xfrm>
+                        <a:off x="4364732" y="1734840"/>
+                        <a:ext cx="495300" cy="254000"/>
+                      </a:xfrm>
+                      <a:prstGeom prst="rect">
+                        <a:avLst/>
+                      </a:prstGeom>
+                      <a:noFill/>
+                      <a:extLst>
+                        <a:ext uri="{909E8E84-426E-40DD-AFC4-6F175D3DCCD1}">
+                          <a14:hiddenFill xmlns:a14="http://schemas.microsoft.com/office/drawing/2010/main">
+                            <a:solidFill>
+                              <a:srgbClr val="FFFFFF"/>
+                            </a:solidFill>
+                          </a14:hiddenFill>
+                        </a:ext>
+                      </a:extLst>
+                    </p:spPr>
+                  </p:pic>
+                </p:oleObj>
+              </mc:Fallback>
+            </mc:AlternateContent>
           </a:graphicData>
         </a:graphic>
       </p:graphicFrame>
@@ -4666,9 +5658,59 @@
         </p:xfrm>
         <a:graphic>
           <a:graphicData uri="http://schemas.openxmlformats.org/presentationml/2006/ole">
-            <p:oleObj spid="_x0000_s2053" name="Equation" r:id="rId7" imgW="482400" imgH="253800" progId="Equation.DSMT4">
-              <p:embed/>
-            </p:oleObj>
+            <mc:AlternateContent xmlns:mc="http://schemas.openxmlformats.org/markup-compatibility/2006">
+              <mc:Choice xmlns:v="urn:schemas-microsoft-com:vml" Requires="v">
+                <p:oleObj spid="_x0000_s2068" name="Equation" r:id="rId9" imgW="482400" imgH="253800" progId="Equation.DSMT4">
+                  <p:embed/>
+                </p:oleObj>
+              </mc:Choice>
+              <mc:Fallback>
+                <p:oleObj name="Equation" r:id="rId9" imgW="482400" imgH="253800" progId="Equation.DSMT4">
+                  <p:embed/>
+                  <p:pic>
+                    <p:nvPicPr>
+                      <p:cNvPr id="0" name="Picture 5"/>
+                      <p:cNvPicPr>
+                        <a:picLocks noChangeAspect="1" noChangeArrowheads="1"/>
+                      </p:cNvPicPr>
+                      <p:nvPr/>
+                    </p:nvPicPr>
+                    <p:blipFill>
+                      <a:blip r:embed="rId10">
+                        <a:extLst>
+                          <a:ext uri="{28A0092B-C50C-407E-A947-70E740481C1C}">
+                            <a14:useLocalDpi xmlns:a14="http://schemas.microsoft.com/office/drawing/2010/main" val="0"/>
+                          </a:ext>
+                        </a:extLst>
+                      </a:blip>
+                      <a:srcRect/>
+                      <a:stretch>
+                        <a:fillRect/>
+                      </a:stretch>
+                    </p:blipFill>
+                    <p:spPr bwMode="auto">
+                      <a:xfrm>
+                        <a:off x="4521448" y="3284984"/>
+                        <a:ext cx="482600" cy="254000"/>
+                      </a:xfrm>
+                      <a:prstGeom prst="rect">
+                        <a:avLst/>
+                      </a:prstGeom>
+                      <a:noFill/>
+                      <a:extLst>
+                        <a:ext uri="{909E8E84-426E-40DD-AFC4-6F175D3DCCD1}">
+                          <a14:hiddenFill xmlns:a14="http://schemas.microsoft.com/office/drawing/2010/main">
+                            <a:solidFill>
+                              <a:srgbClr val="FFFFFF"/>
+                            </a:solidFill>
+                          </a14:hiddenFill>
+                        </a:ext>
+                      </a:extLst>
+                    </p:spPr>
+                  </p:pic>
+                </p:oleObj>
+              </mc:Fallback>
+            </mc:AlternateContent>
           </a:graphicData>
         </a:graphic>
       </p:graphicFrame>
@@ -4719,9 +5761,59 @@
         </p:xfrm>
         <a:graphic>
           <a:graphicData uri="http://schemas.openxmlformats.org/presentationml/2006/ole">
-            <p:oleObj spid="_x0000_s2054" name="Equation" r:id="rId8" imgW="164880" imgH="228600" progId="Equation.DSMT4">
-              <p:embed/>
-            </p:oleObj>
+            <mc:AlternateContent xmlns:mc="http://schemas.openxmlformats.org/markup-compatibility/2006">
+              <mc:Choice xmlns:v="urn:schemas-microsoft-com:vml" Requires="v">
+                <p:oleObj spid="_x0000_s2069" name="Equation" r:id="rId11" imgW="164880" imgH="228600" progId="Equation.DSMT4">
+                  <p:embed/>
+                </p:oleObj>
+              </mc:Choice>
+              <mc:Fallback>
+                <p:oleObj name="Equation" r:id="rId11" imgW="164880" imgH="228600" progId="Equation.DSMT4">
+                  <p:embed/>
+                  <p:pic>
+                    <p:nvPicPr>
+                      <p:cNvPr id="0" name="Picture 6"/>
+                      <p:cNvPicPr>
+                        <a:picLocks noChangeAspect="1" noChangeArrowheads="1"/>
+                      </p:cNvPicPr>
+                      <p:nvPr/>
+                    </p:nvPicPr>
+                    <p:blipFill>
+                      <a:blip r:embed="rId12">
+                        <a:extLst>
+                          <a:ext uri="{28A0092B-C50C-407E-A947-70E740481C1C}">
+                            <a14:useLocalDpi xmlns:a14="http://schemas.microsoft.com/office/drawing/2010/main" val="0"/>
+                          </a:ext>
+                        </a:extLst>
+                      </a:blip>
+                      <a:srcRect/>
+                      <a:stretch>
+                        <a:fillRect/>
+                      </a:stretch>
+                    </p:blipFill>
+                    <p:spPr bwMode="auto">
+                      <a:xfrm>
+                        <a:off x="4219575" y="4162425"/>
+                        <a:ext cx="165100" cy="228600"/>
+                      </a:xfrm>
+                      <a:prstGeom prst="rect">
+                        <a:avLst/>
+                      </a:prstGeom>
+                      <a:noFill/>
+                      <a:extLst>
+                        <a:ext uri="{909E8E84-426E-40DD-AFC4-6F175D3DCCD1}">
+                          <a14:hiddenFill xmlns:a14="http://schemas.microsoft.com/office/drawing/2010/main">
+                            <a:solidFill>
+                              <a:srgbClr val="FFFFFF"/>
+                            </a:solidFill>
+                          </a14:hiddenFill>
+                        </a:ext>
+                      </a:extLst>
+                    </p:spPr>
+                  </p:pic>
+                </p:oleObj>
+              </mc:Fallback>
+            </mc:AlternateContent>
           </a:graphicData>
         </a:graphic>
       </p:graphicFrame>
@@ -4772,9 +5864,59 @@
         </p:xfrm>
         <a:graphic>
           <a:graphicData uri="http://schemas.openxmlformats.org/presentationml/2006/ole">
-            <p:oleObj spid="_x0000_s2055" name="Equation" r:id="rId9" imgW="177480" imgH="228600" progId="Equation.DSMT4">
-              <p:embed/>
-            </p:oleObj>
+            <mc:AlternateContent xmlns:mc="http://schemas.openxmlformats.org/markup-compatibility/2006">
+              <mc:Choice xmlns:v="urn:schemas-microsoft-com:vml" Requires="v">
+                <p:oleObj spid="_x0000_s2070" name="Equation" r:id="rId13" imgW="177480" imgH="228600" progId="Equation.DSMT4">
+                  <p:embed/>
+                </p:oleObj>
+              </mc:Choice>
+              <mc:Fallback>
+                <p:oleObj name="Equation" r:id="rId13" imgW="177480" imgH="228600" progId="Equation.DSMT4">
+                  <p:embed/>
+                  <p:pic>
+                    <p:nvPicPr>
+                      <p:cNvPr id="0" name="Picture 7"/>
+                      <p:cNvPicPr>
+                        <a:picLocks noChangeAspect="1" noChangeArrowheads="1"/>
+                      </p:cNvPicPr>
+                      <p:nvPr/>
+                    </p:nvPicPr>
+                    <p:blipFill>
+                      <a:blip r:embed="rId14">
+                        <a:extLst>
+                          <a:ext uri="{28A0092B-C50C-407E-A947-70E740481C1C}">
+                            <a14:useLocalDpi xmlns:a14="http://schemas.microsoft.com/office/drawing/2010/main" val="0"/>
+                          </a:ext>
+                        </a:extLst>
+                      </a:blip>
+                      <a:srcRect/>
+                      <a:stretch>
+                        <a:fillRect/>
+                      </a:stretch>
+                    </p:blipFill>
+                    <p:spPr bwMode="auto">
+                      <a:xfrm>
+                        <a:off x="6704013" y="2840038"/>
+                        <a:ext cx="177800" cy="228600"/>
+                      </a:xfrm>
+                      <a:prstGeom prst="rect">
+                        <a:avLst/>
+                      </a:prstGeom>
+                      <a:noFill/>
+                      <a:extLst>
+                        <a:ext uri="{909E8E84-426E-40DD-AFC4-6F175D3DCCD1}">
+                          <a14:hiddenFill xmlns:a14="http://schemas.microsoft.com/office/drawing/2010/main">
+                            <a:solidFill>
+                              <a:srgbClr val="FFFFFF"/>
+                            </a:solidFill>
+                          </a14:hiddenFill>
+                        </a:ext>
+                      </a:extLst>
+                    </p:spPr>
+                  </p:pic>
+                </p:oleObj>
+              </mc:Fallback>
+            </mc:AlternateContent>
           </a:graphicData>
         </a:graphic>
       </p:graphicFrame>

</xml_diff>